<commit_message>
finance lesson v1.1 sequence update
finance lesson v1.1 sequence update
</commit_message>
<xml_diff>
--- a/15finance/04 loans.pptx
+++ b/15finance/04 loans.pptx
@@ -5,7 +5,7 @@
     <p:sldMasterId id="2147483648" r:id="rId1"/>
   </p:sldMasterIdLst>
   <p:notesMasterIdLst>
-    <p:notesMasterId r:id="rId20"/>
+    <p:notesMasterId r:id="rId21"/>
   </p:notesMasterIdLst>
   <p:sldIdLst>
     <p:sldId id="256" r:id="rId2"/>
@@ -24,8 +24,9 @@
     <p:sldId id="288" r:id="rId15"/>
     <p:sldId id="291" r:id="rId16"/>
     <p:sldId id="268" r:id="rId17"/>
-    <p:sldId id="289" r:id="rId18"/>
-    <p:sldId id="290" r:id="rId19"/>
+    <p:sldId id="292" r:id="rId18"/>
+    <p:sldId id="289" r:id="rId19"/>
+    <p:sldId id="290" r:id="rId20"/>
   </p:sldIdLst>
   <p:sldSz cx="9144000" cy="6858000" type="screen4x3"/>
   <p:notesSz cx="6858000" cy="9144000"/>
@@ -772,6 +773,92 @@
 </p:notes>
 </file>
 
+<file path=ppt/notesSlides/notesSlide4.xml><?xml version="1.0" encoding="utf-8"?>
+<p:notes xmlns:a="http://schemas.openxmlformats.org/drawingml/2006/main" xmlns:r="http://schemas.openxmlformats.org/officeDocument/2006/relationships" xmlns:p="http://schemas.openxmlformats.org/presentationml/2006/main">
+  <p:cSld>
+    <p:spTree>
+      <p:nvGrpSpPr>
+        <p:cNvPr id="1" name=""/>
+        <p:cNvGrpSpPr/>
+        <p:nvPr/>
+      </p:nvGrpSpPr>
+      <p:grpSpPr>
+        <a:xfrm>
+          <a:off x="0" y="0"/>
+          <a:ext cx="0" cy="0"/>
+          <a:chOff x="0" y="0"/>
+          <a:chExt cx="0" cy="0"/>
+        </a:xfrm>
+      </p:grpSpPr>
+      <p:sp>
+        <p:nvSpPr>
+          <p:cNvPr id="2" name="Slide Image Placeholder 1"/>
+          <p:cNvSpPr>
+            <a:spLocks noGrp="1" noRot="1" noChangeAspect="1"/>
+          </p:cNvSpPr>
+          <p:nvPr>
+            <p:ph type="sldImg"/>
+          </p:nvPr>
+        </p:nvSpPr>
+        <p:spPr/>
+      </p:sp>
+      <p:sp>
+        <p:nvSpPr>
+          <p:cNvPr id="3" name="Notes Placeholder 2"/>
+          <p:cNvSpPr>
+            <a:spLocks noGrp="1"/>
+          </p:cNvSpPr>
+          <p:nvPr>
+            <p:ph type="body" idx="1"/>
+          </p:nvPr>
+        </p:nvSpPr>
+        <p:spPr/>
+        <p:txBody>
+          <a:bodyPr>
+            <a:normAutofit/>
+          </a:bodyPr>
+          <a:lstStyle/>
+          <a:p>
+            <a:r>
+              <a:rPr lang="en-GB" dirty="0" smtClean="0"/>
+              <a:t>50 Lloyds TSB advert Premier Loans</a:t>
+            </a:r>
+            <a:endParaRPr lang="en-GB" dirty="0"/>
+          </a:p>
+        </p:txBody>
+      </p:sp>
+      <p:sp>
+        <p:nvSpPr>
+          <p:cNvPr id="4" name="Slide Number Placeholder 3"/>
+          <p:cNvSpPr>
+            <a:spLocks noGrp="1"/>
+          </p:cNvSpPr>
+          <p:nvPr>
+            <p:ph type="sldNum" sz="quarter" idx="10"/>
+          </p:nvPr>
+        </p:nvSpPr>
+        <p:spPr/>
+        <p:txBody>
+          <a:bodyPr/>
+          <a:lstStyle/>
+          <a:p>
+            <a:fld id="{5A4040F1-E689-47B9-9A5D-C9BA34F75087}" type="slidenum">
+              <a:rPr lang="en-GB" smtClean="0"/>
+              <a:pPr/>
+              <a:t>16</a:t>
+            </a:fld>
+            <a:endParaRPr lang="en-GB"/>
+          </a:p>
+        </p:txBody>
+      </p:sp>
+    </p:spTree>
+  </p:cSld>
+  <p:clrMapOvr>
+    <a:masterClrMapping/>
+  </p:clrMapOvr>
+</p:notes>
+</file>
+
 <file path=ppt/slideLayouts/slideLayout1.xml><?xml version="1.0" encoding="utf-8"?>
 <p:sldLayout xmlns:a="http://schemas.openxmlformats.org/drawingml/2006/main" xmlns:r="http://schemas.openxmlformats.org/officeDocument/2006/relationships" xmlns:p="http://schemas.openxmlformats.org/presentationml/2006/main" type="title" preserve="1">
   <p:cSld name="Title Slide">
@@ -1006,7 +1093,7 @@
     </p:spTree>
     <p:extLst>
       <p:ext uri="{BB962C8B-B14F-4D97-AF65-F5344CB8AC3E}">
-        <p14:creationId xmlns:p14="http://schemas.microsoft.com/office/powerpoint/2010/main" xmlns="" val="980979745"/>
+        <p14:creationId xmlns="" xmlns:p14="http://schemas.microsoft.com/office/powerpoint/2010/main" val="980979745"/>
       </p:ext>
     </p:extLst>
   </p:cSld>
@@ -1178,7 +1265,7 @@
     </p:spTree>
     <p:extLst>
       <p:ext uri="{BB962C8B-B14F-4D97-AF65-F5344CB8AC3E}">
-        <p14:creationId xmlns:p14="http://schemas.microsoft.com/office/powerpoint/2010/main" xmlns="" val="1922985136"/>
+        <p14:creationId xmlns="" xmlns:p14="http://schemas.microsoft.com/office/powerpoint/2010/main" val="1922985136"/>
       </p:ext>
     </p:extLst>
   </p:cSld>
@@ -1360,7 +1447,7 @@
     </p:spTree>
     <p:extLst>
       <p:ext uri="{BB962C8B-B14F-4D97-AF65-F5344CB8AC3E}">
-        <p14:creationId xmlns:p14="http://schemas.microsoft.com/office/powerpoint/2010/main" xmlns="" val="3113491001"/>
+        <p14:creationId xmlns="" xmlns:p14="http://schemas.microsoft.com/office/powerpoint/2010/main" val="3113491001"/>
       </p:ext>
     </p:extLst>
   </p:cSld>
@@ -1532,7 +1619,7 @@
     </p:spTree>
     <p:extLst>
       <p:ext uri="{BB962C8B-B14F-4D97-AF65-F5344CB8AC3E}">
-        <p14:creationId xmlns:p14="http://schemas.microsoft.com/office/powerpoint/2010/main" xmlns="" val="215921456"/>
+        <p14:creationId xmlns="" xmlns:p14="http://schemas.microsoft.com/office/powerpoint/2010/main" val="215921456"/>
       </p:ext>
     </p:extLst>
   </p:cSld>
@@ -1780,7 +1867,7 @@
     </p:spTree>
     <p:extLst>
       <p:ext uri="{BB962C8B-B14F-4D97-AF65-F5344CB8AC3E}">
-        <p14:creationId xmlns:p14="http://schemas.microsoft.com/office/powerpoint/2010/main" xmlns="" val="3198142514"/>
+        <p14:creationId xmlns="" xmlns:p14="http://schemas.microsoft.com/office/powerpoint/2010/main" val="3198142514"/>
       </p:ext>
     </p:extLst>
   </p:cSld>
@@ -2070,7 +2157,7 @@
     </p:spTree>
     <p:extLst>
       <p:ext uri="{BB962C8B-B14F-4D97-AF65-F5344CB8AC3E}">
-        <p14:creationId xmlns:p14="http://schemas.microsoft.com/office/powerpoint/2010/main" xmlns="" val="354152659"/>
+        <p14:creationId xmlns="" xmlns:p14="http://schemas.microsoft.com/office/powerpoint/2010/main" val="354152659"/>
       </p:ext>
     </p:extLst>
   </p:cSld>
@@ -2494,7 +2581,7 @@
     </p:spTree>
     <p:extLst>
       <p:ext uri="{BB962C8B-B14F-4D97-AF65-F5344CB8AC3E}">
-        <p14:creationId xmlns:p14="http://schemas.microsoft.com/office/powerpoint/2010/main" xmlns="" val="2943182003"/>
+        <p14:creationId xmlns="" xmlns:p14="http://schemas.microsoft.com/office/powerpoint/2010/main" val="2943182003"/>
       </p:ext>
     </p:extLst>
   </p:cSld>
@@ -2614,7 +2701,7 @@
     </p:spTree>
     <p:extLst>
       <p:ext uri="{BB962C8B-B14F-4D97-AF65-F5344CB8AC3E}">
-        <p14:creationId xmlns:p14="http://schemas.microsoft.com/office/powerpoint/2010/main" xmlns="" val="374939806"/>
+        <p14:creationId xmlns="" xmlns:p14="http://schemas.microsoft.com/office/powerpoint/2010/main" val="374939806"/>
       </p:ext>
     </p:extLst>
   </p:cSld>
@@ -2711,7 +2798,7 @@
     </p:spTree>
     <p:extLst>
       <p:ext uri="{BB962C8B-B14F-4D97-AF65-F5344CB8AC3E}">
-        <p14:creationId xmlns:p14="http://schemas.microsoft.com/office/powerpoint/2010/main" xmlns="" val="2762883317"/>
+        <p14:creationId xmlns="" xmlns:p14="http://schemas.microsoft.com/office/powerpoint/2010/main" val="2762883317"/>
       </p:ext>
     </p:extLst>
   </p:cSld>
@@ -2990,7 +3077,7 @@
     </p:spTree>
     <p:extLst>
       <p:ext uri="{BB962C8B-B14F-4D97-AF65-F5344CB8AC3E}">
-        <p14:creationId xmlns:p14="http://schemas.microsoft.com/office/powerpoint/2010/main" xmlns="" val="2084638986"/>
+        <p14:creationId xmlns="" xmlns:p14="http://schemas.microsoft.com/office/powerpoint/2010/main" val="2084638986"/>
       </p:ext>
     </p:extLst>
   </p:cSld>
@@ -3245,7 +3332,7 @@
     </p:spTree>
     <p:extLst>
       <p:ext uri="{BB962C8B-B14F-4D97-AF65-F5344CB8AC3E}">
-        <p14:creationId xmlns:p14="http://schemas.microsoft.com/office/powerpoint/2010/main" xmlns="" val="419711352"/>
+        <p14:creationId xmlns="" xmlns:p14="http://schemas.microsoft.com/office/powerpoint/2010/main" val="419711352"/>
       </p:ext>
     </p:extLst>
   </p:cSld>
@@ -3496,7 +3583,7 @@
     </p:spTree>
     <p:extLst>
       <p:ext uri="{BB962C8B-B14F-4D97-AF65-F5344CB8AC3E}">
-        <p14:creationId xmlns:p14="http://schemas.microsoft.com/office/powerpoint/2010/main" xmlns="" val="2844166414"/>
+        <p14:creationId xmlns="" xmlns:p14="http://schemas.microsoft.com/office/powerpoint/2010/main" val="2844166414"/>
       </p:ext>
     </p:extLst>
   </p:cSld>
@@ -3837,7 +3924,7 @@
           <a:blip r:embed="rId2" cstate="print">
             <a:extLst>
               <a:ext uri="{28A0092B-C50C-407E-A947-70E740481C1C}">
-                <a14:useLocalDpi xmlns:a14="http://schemas.microsoft.com/office/drawing/2010/main" xmlns="" val="0"/>
+                <a14:useLocalDpi xmlns="" xmlns:a14="http://schemas.microsoft.com/office/drawing/2010/main" val="0"/>
               </a:ext>
             </a:extLst>
           </a:blip>
@@ -3857,7 +3944,7 @@
           <a:noFill/>
           <a:extLst>
             <a:ext uri="{909E8E84-426E-40DD-AFC4-6F175D3DCCD1}">
-              <a14:hiddenFill xmlns:a14="http://schemas.microsoft.com/office/drawing/2010/main" xmlns="">
+              <a14:hiddenFill xmlns="" xmlns:a14="http://schemas.microsoft.com/office/drawing/2010/main">
                 <a:solidFill>
                   <a:srgbClr val="FFFFFF"/>
                 </a:solidFill>
@@ -3869,7 +3956,7 @@
     </p:spTree>
     <p:extLst>
       <p:ext uri="{BB962C8B-B14F-4D97-AF65-F5344CB8AC3E}">
-        <p14:creationId xmlns:p14="http://schemas.microsoft.com/office/powerpoint/2010/main" xmlns="" val="4153523087"/>
+        <p14:creationId xmlns="" xmlns:p14="http://schemas.microsoft.com/office/powerpoint/2010/main" val="4153523087"/>
       </p:ext>
     </p:extLst>
   </p:cSld>
@@ -3976,7 +4063,7 @@
           <a:blip r:embed="rId3" cstate="print">
             <a:extLst>
               <a:ext uri="{28A0092B-C50C-407E-A947-70E740481C1C}">
-                <a14:useLocalDpi xmlns:a14="http://schemas.microsoft.com/office/drawing/2010/main" xmlns="" val="0"/>
+                <a14:useLocalDpi xmlns="" xmlns:a14="http://schemas.microsoft.com/office/drawing/2010/main" val="0"/>
               </a:ext>
             </a:extLst>
           </a:blip>
@@ -3996,7 +4083,7 @@
           <a:noFill/>
           <a:extLst>
             <a:ext uri="{909E8E84-426E-40DD-AFC4-6F175D3DCCD1}">
-              <a14:hiddenFill xmlns:a14="http://schemas.microsoft.com/office/drawing/2010/main" xmlns="">
+              <a14:hiddenFill xmlns="" xmlns:a14="http://schemas.microsoft.com/office/drawing/2010/main">
                 <a:solidFill>
                   <a:srgbClr val="FFFFFF"/>
                 </a:solidFill>
@@ -4008,7 +4095,7 @@
     </p:spTree>
     <p:extLst>
       <p:ext uri="{BB962C8B-B14F-4D97-AF65-F5344CB8AC3E}">
-        <p14:creationId xmlns:p14="http://schemas.microsoft.com/office/powerpoint/2010/main" xmlns="" val="2286413160"/>
+        <p14:creationId xmlns="" xmlns:p14="http://schemas.microsoft.com/office/powerpoint/2010/main" val="2286413160"/>
       </p:ext>
     </p:extLst>
   </p:cSld>
@@ -4186,7 +4273,7 @@
           <a:blip r:embed="rId3" cstate="print">
             <a:extLst>
               <a:ext uri="{28A0092B-C50C-407E-A947-70E740481C1C}">
-                <a14:useLocalDpi xmlns:a14="http://schemas.microsoft.com/office/drawing/2010/main" xmlns="" val="0"/>
+                <a14:useLocalDpi xmlns="" xmlns:a14="http://schemas.microsoft.com/office/drawing/2010/main" val="0"/>
               </a:ext>
             </a:extLst>
           </a:blip>
@@ -4206,7 +4293,7 @@
           <a:noFill/>
           <a:extLst>
             <a:ext uri="{909E8E84-426E-40DD-AFC4-6F175D3DCCD1}">
-              <a14:hiddenFill xmlns:a14="http://schemas.microsoft.com/office/drawing/2010/main" xmlns="">
+              <a14:hiddenFill xmlns="" xmlns:a14="http://schemas.microsoft.com/office/drawing/2010/main">
                 <a:solidFill>
                   <a:srgbClr val="FFFFFF"/>
                 </a:solidFill>
@@ -4218,7 +4305,7 @@
     </p:spTree>
     <p:extLst>
       <p:ext uri="{BB962C8B-B14F-4D97-AF65-F5344CB8AC3E}">
-        <p14:creationId xmlns:p14="http://schemas.microsoft.com/office/powerpoint/2010/main" xmlns="" val="2137850356"/>
+        <p14:creationId xmlns="" xmlns:p14="http://schemas.microsoft.com/office/powerpoint/2010/main" val="2137850356"/>
       </p:ext>
     </p:extLst>
   </p:cSld>
@@ -4334,7 +4421,7 @@
           <a:blip r:embed="rId4" cstate="print">
             <a:extLst>
               <a:ext uri="{28A0092B-C50C-407E-A947-70E740481C1C}">
-                <a14:useLocalDpi xmlns:a14="http://schemas.microsoft.com/office/drawing/2010/main" xmlns="" val="0"/>
+                <a14:useLocalDpi xmlns="" xmlns:a14="http://schemas.microsoft.com/office/drawing/2010/main" val="0"/>
               </a:ext>
             </a:extLst>
           </a:blip>
@@ -4354,7 +4441,7 @@
           <a:noFill/>
           <a:extLst>
             <a:ext uri="{909E8E84-426E-40DD-AFC4-6F175D3DCCD1}">
-              <a14:hiddenFill xmlns:a14="http://schemas.microsoft.com/office/drawing/2010/main" xmlns="">
+              <a14:hiddenFill xmlns="" xmlns:a14="http://schemas.microsoft.com/office/drawing/2010/main">
                 <a:solidFill>
                   <a:srgbClr val="FFFFFF"/>
                 </a:solidFill>
@@ -4396,7 +4483,7 @@
     </p:spTree>
     <p:extLst>
       <p:ext uri="{BB962C8B-B14F-4D97-AF65-F5344CB8AC3E}">
-        <p14:creationId xmlns:p14="http://schemas.microsoft.com/office/powerpoint/2010/main" xmlns="" val="229895401"/>
+        <p14:creationId xmlns="" xmlns:p14="http://schemas.microsoft.com/office/powerpoint/2010/main" val="229895401"/>
       </p:ext>
     </p:extLst>
   </p:cSld>
@@ -4600,7 +4687,15 @@
           <a:p>
             <a:r>
               <a:rPr lang="en-GB" dirty="0" smtClean="0"/>
-              <a:t>Using the website download and open document task01.docx</a:t>
+              <a:t>Using the website download and open document </a:t>
+            </a:r>
+            <a:r>
+              <a:rPr lang="en-GB" b="1" dirty="0" smtClean="0">
+                <a:solidFill>
+                  <a:srgbClr val="FF0000"/>
+                </a:solidFill>
+              </a:rPr>
+              <a:t>task01.docx</a:t>
             </a:r>
           </a:p>
           <a:p>
@@ -4746,7 +4841,7 @@
       <p:pic>
         <p:nvPicPr>
           <p:cNvPr id="4098" name="Picture 2">
-            <a:hlinkClick r:id="rId2"/>
+            <a:hlinkClick r:id="rId3"/>
           </p:cNvPr>
           <p:cNvPicPr>
             <a:picLocks noChangeAspect="1" noChangeArrowheads="1"/>
@@ -4754,10 +4849,10 @@
           <p:nvPr/>
         </p:nvPicPr>
         <p:blipFill rotWithShape="1">
-          <a:blip r:embed="rId3" cstate="print">
+          <a:blip r:embed="rId4" cstate="print">
             <a:extLst>
               <a:ext uri="{28A0092B-C50C-407E-A947-70E740481C1C}">
-                <a14:useLocalDpi xmlns:a14="http://schemas.microsoft.com/office/drawing/2010/main" xmlns="" val="0"/>
+                <a14:useLocalDpi xmlns="" xmlns:a14="http://schemas.microsoft.com/office/drawing/2010/main" val="0"/>
               </a:ext>
             </a:extLst>
           </a:blip>
@@ -4778,14 +4873,14 @@
           </a:ln>
           <a:extLst>
             <a:ext uri="{909E8E84-426E-40DD-AFC4-6F175D3DCCD1}">
-              <a14:hiddenFill xmlns:a14="http://schemas.microsoft.com/office/drawing/2010/main" xmlns="">
+              <a14:hiddenFill xmlns="" xmlns:a14="http://schemas.microsoft.com/office/drawing/2010/main">
                 <a:solidFill>
                   <a:schemeClr val="accent1"/>
                 </a:solidFill>
               </a14:hiddenFill>
             </a:ext>
             <a:ext uri="{91240B29-F687-4F45-9708-019B960494DF}">
-              <a14:hiddenLine xmlns:a14="http://schemas.microsoft.com/office/drawing/2010/main" xmlns="" w="9525">
+              <a14:hiddenLine xmlns="" xmlns:a14="http://schemas.microsoft.com/office/drawing/2010/main" w="9525">
                 <a:solidFill>
                   <a:schemeClr val="tx1"/>
                 </a:solidFill>
@@ -4828,7 +4923,7 @@
     </p:spTree>
     <p:extLst>
       <p:ext uri="{BB962C8B-B14F-4D97-AF65-F5344CB8AC3E}">
-        <p14:creationId xmlns:p14="http://schemas.microsoft.com/office/powerpoint/2010/main" xmlns="" val="2719578318"/>
+        <p14:creationId xmlns="" xmlns:p14="http://schemas.microsoft.com/office/powerpoint/2010/main" val="2719578318"/>
       </p:ext>
     </p:extLst>
   </p:cSld>
@@ -4879,6 +4974,176 @@
           <a:p>
             <a:r>
               <a:rPr lang="en-GB" dirty="0" smtClean="0"/>
+              <a:t>Assorted</a:t>
+            </a:r>
+            <a:r>
+              <a:rPr lang="en-GB" dirty="0" smtClean="0"/>
+              <a:t> </a:t>
+            </a:r>
+            <a:r>
+              <a:rPr lang="en-GB" dirty="0" smtClean="0"/>
+              <a:t>Loan Calculations</a:t>
+            </a:r>
+            <a:endParaRPr lang="en-GB" dirty="0"/>
+          </a:p>
+        </p:txBody>
+      </p:sp>
+      <p:sp>
+        <p:nvSpPr>
+          <p:cNvPr id="3" name="Content Placeholder 2"/>
+          <p:cNvSpPr>
+            <a:spLocks noGrp="1"/>
+          </p:cNvSpPr>
+          <p:nvPr>
+            <p:ph idx="1"/>
+          </p:nvPr>
+        </p:nvSpPr>
+        <p:spPr>
+          <a:xfrm>
+            <a:off x="179512" y="1340768"/>
+            <a:ext cx="5040560" cy="5184576"/>
+          </a:xfrm>
+        </p:spPr>
+        <p:txBody>
+          <a:bodyPr>
+            <a:normAutofit/>
+          </a:bodyPr>
+          <a:lstStyle/>
+          <a:p>
+            <a:r>
+              <a:rPr lang="en-GB" dirty="0" smtClean="0"/>
+              <a:t>Using the website download and open document </a:t>
+            </a:r>
+            <a:r>
+              <a:rPr lang="en-GB" b="1" dirty="0" smtClean="0">
+                <a:solidFill>
+                  <a:srgbClr val="FF0000"/>
+                </a:solidFill>
+              </a:rPr>
+              <a:t>task02.docx</a:t>
+            </a:r>
+            <a:endParaRPr lang="en-GB" b="1" dirty="0" smtClean="0">
+              <a:solidFill>
+                <a:srgbClr val="FF0000"/>
+              </a:solidFill>
+            </a:endParaRPr>
+          </a:p>
+          <a:p>
+            <a:r>
+              <a:rPr lang="en-GB" dirty="0" smtClean="0"/>
+              <a:t>Find the loan REPRESENTATIVE APR’s</a:t>
+            </a:r>
+          </a:p>
+          <a:p>
+            <a:r>
+              <a:rPr lang="en-GB" dirty="0" smtClean="0"/>
+              <a:t>Using the provided loan calculator website work out the interest for each company</a:t>
+            </a:r>
+            <a:endParaRPr lang="en-GB" dirty="0"/>
+          </a:p>
+        </p:txBody>
+      </p:sp>
+      <p:pic>
+        <p:nvPicPr>
+          <p:cNvPr id="1027" name="Picture 3" descr="C:\data\gitnew02\paulcockram7.github.io\15finance\loans\loancalc01.jpg"/>
+          <p:cNvPicPr>
+            <a:picLocks noChangeAspect="1" noChangeArrowheads="1"/>
+          </p:cNvPicPr>
+          <p:nvPr/>
+        </p:nvPicPr>
+        <p:blipFill>
+          <a:blip r:embed="rId2" cstate="print"/>
+          <a:srcRect/>
+          <a:stretch>
+            <a:fillRect/>
+          </a:stretch>
+        </p:blipFill>
+        <p:spPr bwMode="auto">
+          <a:xfrm>
+            <a:off x="4750205" y="4077072"/>
+            <a:ext cx="4393795" cy="2592288"/>
+          </a:xfrm>
+          <a:prstGeom prst="rect">
+            <a:avLst/>
+          </a:prstGeom>
+          <a:noFill/>
+        </p:spPr>
+      </p:pic>
+      <p:pic>
+        <p:nvPicPr>
+          <p:cNvPr id="4" name="Picture 2" descr="C:\data\gitnew02\paulcockram7.github.io\15finance\loans\task02.jpg"/>
+          <p:cNvPicPr>
+            <a:picLocks noChangeAspect="1" noChangeArrowheads="1"/>
+          </p:cNvPicPr>
+          <p:nvPr/>
+        </p:nvPicPr>
+        <p:blipFill>
+          <a:blip r:embed="rId3" cstate="print"/>
+          <a:srcRect/>
+          <a:stretch>
+            <a:fillRect/>
+          </a:stretch>
+        </p:blipFill>
+        <p:spPr bwMode="auto">
+          <a:xfrm>
+            <a:off x="5652120" y="1196752"/>
+            <a:ext cx="2780631" cy="2583990"/>
+          </a:xfrm>
+          <a:prstGeom prst="rect">
+            <a:avLst/>
+          </a:prstGeom>
+          <a:noFill/>
+        </p:spPr>
+      </p:pic>
+    </p:spTree>
+  </p:cSld>
+  <p:clrMapOvr>
+    <a:masterClrMapping/>
+  </p:clrMapOvr>
+  <p:timing>
+    <p:tnLst>
+      <p:par>
+        <p:cTn id="1" dur="indefinite" restart="never" nodeType="tmRoot"/>
+      </p:par>
+    </p:tnLst>
+  </p:timing>
+</p:sld>
+</file>
+
+<file path=ppt/slides/slide18.xml><?xml version="1.0" encoding="utf-8"?>
+<p:sld xmlns:a="http://schemas.openxmlformats.org/drawingml/2006/main" xmlns:r="http://schemas.openxmlformats.org/officeDocument/2006/relationships" xmlns:p="http://schemas.openxmlformats.org/presentationml/2006/main">
+  <p:cSld>
+    <p:spTree>
+      <p:nvGrpSpPr>
+        <p:cNvPr id="1" name=""/>
+        <p:cNvGrpSpPr/>
+        <p:nvPr/>
+      </p:nvGrpSpPr>
+      <p:grpSpPr>
+        <a:xfrm>
+          <a:off x="0" y="0"/>
+          <a:ext cx="0" cy="0"/>
+          <a:chOff x="0" y="0"/>
+          <a:chExt cx="0" cy="0"/>
+        </a:xfrm>
+      </p:grpSpPr>
+      <p:sp>
+        <p:nvSpPr>
+          <p:cNvPr id="2" name="Title 1"/>
+          <p:cNvSpPr>
+            <a:spLocks noGrp="1"/>
+          </p:cNvSpPr>
+          <p:nvPr>
+            <p:ph type="title"/>
+          </p:nvPr>
+        </p:nvSpPr>
+        <p:spPr/>
+        <p:txBody>
+          <a:bodyPr/>
+          <a:lstStyle/>
+          <a:p>
+            <a:r>
+              <a:rPr lang="en-GB" dirty="0" smtClean="0"/>
               <a:t>How you are judged for a Loan ?</a:t>
             </a:r>
             <a:endParaRPr lang="en-GB" dirty="0"/>
@@ -4897,7 +5162,9 @@
         </p:nvSpPr>
         <p:spPr/>
         <p:txBody>
-          <a:bodyPr/>
+          <a:bodyPr>
+            <a:normAutofit lnSpcReduction="10000"/>
+          </a:bodyPr>
           <a:lstStyle/>
           <a:p>
             <a:r>
@@ -4939,18 +5206,32 @@
           <a:p>
             <a:r>
               <a:rPr lang="en-GB" dirty="0" smtClean="0"/>
-              <a:t>List the things lenders look for when making a loan decision in this word </a:t>
-            </a:r>
+              <a:t>List the things lenders look for when making a loan decision in this word document</a:t>
+            </a:r>
+          </a:p>
+          <a:p>
+            <a:pPr lvl="1"/>
             <a:r>
               <a:rPr lang="en-GB" dirty="0" smtClean="0"/>
-              <a:t>document</a:t>
-            </a:r>
-          </a:p>
-          <a:p>
-            <a:pPr lvl="1"/>
-            <a:r>
-              <a:rPr lang="en-GB" smtClean="0"/>
-              <a:t>try to find at least 6 things</a:t>
+              <a:t>try to find at least 6 </a:t>
+            </a:r>
+            <a:r>
+              <a:rPr lang="en-GB" dirty="0" smtClean="0"/>
+              <a:t>things</a:t>
+            </a:r>
+          </a:p>
+          <a:p>
+            <a:r>
+              <a:rPr lang="en-GB" b="1" dirty="0" smtClean="0">
+                <a:solidFill>
+                  <a:srgbClr val="FF0000"/>
+                </a:solidFill>
+              </a:rPr>
+              <a:t>TASK 3 </a:t>
+            </a:r>
+            <a:r>
+              <a:rPr lang="en-GB" dirty="0" smtClean="0"/>
+              <a:t>on the website</a:t>
             </a:r>
             <a:endParaRPr lang="en-GB" dirty="0"/>
           </a:p>
@@ -4964,7 +5245,7 @@
 </p:sld>
 </file>
 
-<file path=ppt/slides/slide18.xml><?xml version="1.0" encoding="utf-8"?>
+<file path=ppt/slides/slide19.xml><?xml version="1.0" encoding="utf-8"?>
 <p:sld xmlns:a="http://schemas.openxmlformats.org/drawingml/2006/main" xmlns:r="http://schemas.openxmlformats.org/officeDocument/2006/relationships" xmlns:p="http://schemas.openxmlformats.org/presentationml/2006/main">
   <p:cSld>
     <p:spTree>
@@ -5149,7 +5430,7 @@
           <a:blip r:embed="rId3" cstate="print">
             <a:extLst>
               <a:ext uri="{28A0092B-C50C-407E-A947-70E740481C1C}">
-                <a14:useLocalDpi xmlns:a14="http://schemas.microsoft.com/office/drawing/2010/main" xmlns="" val="0"/>
+                <a14:useLocalDpi xmlns="" xmlns:a14="http://schemas.microsoft.com/office/drawing/2010/main" val="0"/>
               </a:ext>
             </a:extLst>
           </a:blip>
@@ -5169,7 +5450,7 @@
           <a:noFill/>
           <a:extLst>
             <a:ext uri="{909E8E84-426E-40DD-AFC4-6F175D3DCCD1}">
-              <a14:hiddenFill xmlns:a14="http://schemas.microsoft.com/office/drawing/2010/main" xmlns="">
+              <a14:hiddenFill xmlns="" xmlns:a14="http://schemas.microsoft.com/office/drawing/2010/main">
                 <a:solidFill>
                   <a:srgbClr val="FFFFFF"/>
                 </a:solidFill>
@@ -5181,7 +5462,7 @@
     </p:spTree>
     <p:extLst>
       <p:ext uri="{BB962C8B-B14F-4D97-AF65-F5344CB8AC3E}">
-        <p14:creationId xmlns:p14="http://schemas.microsoft.com/office/powerpoint/2010/main" xmlns="" val="529809207"/>
+        <p14:creationId xmlns="" xmlns:p14="http://schemas.microsoft.com/office/powerpoint/2010/main" val="529809207"/>
       </p:ext>
     </p:extLst>
   </p:cSld>
@@ -5286,7 +5567,7 @@
           <a:blip r:embed="rId2" cstate="print">
             <a:extLst>
               <a:ext uri="{28A0092B-C50C-407E-A947-70E740481C1C}">
-                <a14:useLocalDpi xmlns:a14="http://schemas.microsoft.com/office/drawing/2010/main" xmlns="" val="0"/>
+                <a14:useLocalDpi xmlns="" xmlns:a14="http://schemas.microsoft.com/office/drawing/2010/main" val="0"/>
               </a:ext>
             </a:extLst>
           </a:blip>
@@ -5306,7 +5587,7 @@
           <a:noFill/>
           <a:extLst>
             <a:ext uri="{909E8E84-426E-40DD-AFC4-6F175D3DCCD1}">
-              <a14:hiddenFill xmlns:a14="http://schemas.microsoft.com/office/drawing/2010/main" xmlns="">
+              <a14:hiddenFill xmlns="" xmlns:a14="http://schemas.microsoft.com/office/drawing/2010/main">
                 <a:solidFill>
                   <a:srgbClr val="FFFFFF"/>
                 </a:solidFill>
@@ -5318,7 +5599,7 @@
     </p:spTree>
     <p:extLst>
       <p:ext uri="{BB962C8B-B14F-4D97-AF65-F5344CB8AC3E}">
-        <p14:creationId xmlns:p14="http://schemas.microsoft.com/office/powerpoint/2010/main" xmlns="" val="1708264490"/>
+        <p14:creationId xmlns="" xmlns:p14="http://schemas.microsoft.com/office/powerpoint/2010/main" val="1708264490"/>
       </p:ext>
     </p:extLst>
   </p:cSld>
@@ -5414,7 +5695,7 @@
           <a:blip r:embed="rId2" cstate="print">
             <a:extLst>
               <a:ext uri="{28A0092B-C50C-407E-A947-70E740481C1C}">
-                <a14:useLocalDpi xmlns:a14="http://schemas.microsoft.com/office/drawing/2010/main" xmlns="" val="0"/>
+                <a14:useLocalDpi xmlns="" xmlns:a14="http://schemas.microsoft.com/office/drawing/2010/main" val="0"/>
               </a:ext>
             </a:extLst>
           </a:blip>
@@ -5434,7 +5715,7 @@
           <a:noFill/>
           <a:extLst>
             <a:ext uri="{909E8E84-426E-40DD-AFC4-6F175D3DCCD1}">
-              <a14:hiddenFill xmlns:a14="http://schemas.microsoft.com/office/drawing/2010/main" xmlns="">
+              <a14:hiddenFill xmlns="" xmlns:a14="http://schemas.microsoft.com/office/drawing/2010/main">
                 <a:solidFill>
                   <a:srgbClr val="FFFFFF"/>
                 </a:solidFill>
@@ -5446,7 +5727,7 @@
     </p:spTree>
     <p:extLst>
       <p:ext uri="{BB962C8B-B14F-4D97-AF65-F5344CB8AC3E}">
-        <p14:creationId xmlns:p14="http://schemas.microsoft.com/office/powerpoint/2010/main" xmlns="" val="1003174057"/>
+        <p14:creationId xmlns="" xmlns:p14="http://schemas.microsoft.com/office/powerpoint/2010/main" val="1003174057"/>
       </p:ext>
     </p:extLst>
   </p:cSld>
@@ -5535,7 +5816,7 @@
           <a:blip r:embed="rId3" cstate="print">
             <a:extLst>
               <a:ext uri="{28A0092B-C50C-407E-A947-70E740481C1C}">
-                <a14:useLocalDpi xmlns:a14="http://schemas.microsoft.com/office/drawing/2010/main" xmlns="" val="0"/>
+                <a14:useLocalDpi xmlns="" xmlns:a14="http://schemas.microsoft.com/office/drawing/2010/main" val="0"/>
               </a:ext>
             </a:extLst>
           </a:blip>
@@ -5555,7 +5836,7 @@
           <a:noFill/>
           <a:extLst>
             <a:ext uri="{909E8E84-426E-40DD-AFC4-6F175D3DCCD1}">
-              <a14:hiddenFill xmlns:a14="http://schemas.microsoft.com/office/drawing/2010/main" xmlns="">
+              <a14:hiddenFill xmlns="" xmlns:a14="http://schemas.microsoft.com/office/drawing/2010/main">
                 <a:solidFill>
                   <a:srgbClr val="FFFFFF"/>
                 </a:solidFill>
@@ -5567,7 +5848,7 @@
     </p:spTree>
     <p:extLst>
       <p:ext uri="{BB962C8B-B14F-4D97-AF65-F5344CB8AC3E}">
-        <p14:creationId xmlns:p14="http://schemas.microsoft.com/office/powerpoint/2010/main" xmlns="" val="3706863804"/>
+        <p14:creationId xmlns="" xmlns:p14="http://schemas.microsoft.com/office/powerpoint/2010/main" val="3706863804"/>
       </p:ext>
     </p:extLst>
   </p:cSld>
@@ -5674,7 +5955,7 @@
           <a:blip r:embed="rId4" cstate="print">
             <a:extLst>
               <a:ext uri="{28A0092B-C50C-407E-A947-70E740481C1C}">
-                <a14:useLocalDpi xmlns:a14="http://schemas.microsoft.com/office/drawing/2010/main" xmlns="" val="0"/>
+                <a14:useLocalDpi xmlns="" xmlns:a14="http://schemas.microsoft.com/office/drawing/2010/main" val="0"/>
               </a:ext>
             </a:extLst>
           </a:blip>
@@ -5694,7 +5975,7 @@
           <a:noFill/>
           <a:extLst>
             <a:ext uri="{909E8E84-426E-40DD-AFC4-6F175D3DCCD1}">
-              <a14:hiddenFill xmlns:a14="http://schemas.microsoft.com/office/drawing/2010/main" xmlns="">
+              <a14:hiddenFill xmlns="" xmlns:a14="http://schemas.microsoft.com/office/drawing/2010/main">
                 <a:solidFill>
                   <a:srgbClr val="FFFFFF"/>
                 </a:solidFill>
@@ -5706,7 +5987,7 @@
     </p:spTree>
     <p:extLst>
       <p:ext uri="{BB962C8B-B14F-4D97-AF65-F5344CB8AC3E}">
-        <p14:creationId xmlns:p14="http://schemas.microsoft.com/office/powerpoint/2010/main" xmlns="" val="1169492922"/>
+        <p14:creationId xmlns="" xmlns:p14="http://schemas.microsoft.com/office/powerpoint/2010/main" val="1169492922"/>
       </p:ext>
     </p:extLst>
   </p:cSld>
@@ -5807,7 +6088,7 @@
           <a:blip r:embed="rId3" cstate="print">
             <a:extLst>
               <a:ext uri="{28A0092B-C50C-407E-A947-70E740481C1C}">
-                <a14:useLocalDpi xmlns:a14="http://schemas.microsoft.com/office/drawing/2010/main" xmlns="" val="0"/>
+                <a14:useLocalDpi xmlns="" xmlns:a14="http://schemas.microsoft.com/office/drawing/2010/main" val="0"/>
               </a:ext>
             </a:extLst>
           </a:blip>
@@ -5827,7 +6108,7 @@
           <a:noFill/>
           <a:extLst>
             <a:ext uri="{909E8E84-426E-40DD-AFC4-6F175D3DCCD1}">
-              <a14:hiddenFill xmlns:a14="http://schemas.microsoft.com/office/drawing/2010/main" xmlns="">
+              <a14:hiddenFill xmlns="" xmlns:a14="http://schemas.microsoft.com/office/drawing/2010/main">
                 <a:solidFill>
                   <a:srgbClr val="FFFFFF"/>
                 </a:solidFill>
@@ -5839,7 +6120,7 @@
     </p:spTree>
     <p:extLst>
       <p:ext uri="{BB962C8B-B14F-4D97-AF65-F5344CB8AC3E}">
-        <p14:creationId xmlns:p14="http://schemas.microsoft.com/office/powerpoint/2010/main" xmlns="" val="3547174188"/>
+        <p14:creationId xmlns="" xmlns:p14="http://schemas.microsoft.com/office/powerpoint/2010/main" val="3547174188"/>
       </p:ext>
     </p:extLst>
   </p:cSld>
@@ -5946,7 +6227,7 @@
           <a:blip r:embed="rId3" cstate="print">
             <a:extLst>
               <a:ext uri="{28A0092B-C50C-407E-A947-70E740481C1C}">
-                <a14:useLocalDpi xmlns:a14="http://schemas.microsoft.com/office/drawing/2010/main" xmlns="" val="0"/>
+                <a14:useLocalDpi xmlns="" xmlns:a14="http://schemas.microsoft.com/office/drawing/2010/main" val="0"/>
               </a:ext>
             </a:extLst>
           </a:blip>
@@ -5966,7 +6247,7 @@
           <a:noFill/>
           <a:extLst>
             <a:ext uri="{909E8E84-426E-40DD-AFC4-6F175D3DCCD1}">
-              <a14:hiddenFill xmlns:a14="http://schemas.microsoft.com/office/drawing/2010/main" xmlns="">
+              <a14:hiddenFill xmlns="" xmlns:a14="http://schemas.microsoft.com/office/drawing/2010/main">
                 <a:solidFill>
                   <a:srgbClr val="FFFFFF"/>
                 </a:solidFill>
@@ -5978,7 +6259,7 @@
     </p:spTree>
     <p:extLst>
       <p:ext uri="{BB962C8B-B14F-4D97-AF65-F5344CB8AC3E}">
-        <p14:creationId xmlns:p14="http://schemas.microsoft.com/office/powerpoint/2010/main" xmlns="" val="3335667276"/>
+        <p14:creationId xmlns="" xmlns:p14="http://schemas.microsoft.com/office/powerpoint/2010/main" val="3335667276"/>
       </p:ext>
     </p:extLst>
   </p:cSld>
@@ -6310,7 +6591,7 @@
           <a:blip r:embed="rId3" cstate="print">
             <a:extLst>
               <a:ext uri="{28A0092B-C50C-407E-A947-70E740481C1C}">
-                <a14:useLocalDpi xmlns:a14="http://schemas.microsoft.com/office/drawing/2010/main" xmlns="" val="0"/>
+                <a14:useLocalDpi xmlns="" xmlns:a14="http://schemas.microsoft.com/office/drawing/2010/main" val="0"/>
               </a:ext>
             </a:extLst>
           </a:blip>
@@ -6330,7 +6611,7 @@
           <a:noFill/>
           <a:extLst>
             <a:ext uri="{909E8E84-426E-40DD-AFC4-6F175D3DCCD1}">
-              <a14:hiddenFill xmlns:a14="http://schemas.microsoft.com/office/drawing/2010/main" xmlns="">
+              <a14:hiddenFill xmlns="" xmlns:a14="http://schemas.microsoft.com/office/drawing/2010/main">
                 <a:solidFill>
                   <a:srgbClr val="FFFFFF"/>
                 </a:solidFill>
@@ -6342,7 +6623,7 @@
     </p:spTree>
     <p:extLst>
       <p:ext uri="{BB962C8B-B14F-4D97-AF65-F5344CB8AC3E}">
-        <p14:creationId xmlns:p14="http://schemas.microsoft.com/office/powerpoint/2010/main" xmlns="" val="185172268"/>
+        <p14:creationId xmlns="" xmlns:p14="http://schemas.microsoft.com/office/powerpoint/2010/main" val="185172268"/>
       </p:ext>
     </p:extLst>
   </p:cSld>

</xml_diff>

<commit_message>
finance lesson 4 v2.0 final
finance lesson 4 v2.0 final
</commit_message>
<xml_diff>
--- a/15finance/04 loans.pptx
+++ b/15finance/04 loans.pptx
@@ -211,7 +211,7 @@
             <a:fld id="{D03A9B44-2E6A-4EE5-AE8D-5F1B9CBBEBDB}" type="datetimeFigureOut">
               <a:rPr lang="en-GB" smtClean="0"/>
               <a:pPr/>
-              <a:t>03/12/2016</a:t>
+              <a:t>04/12/2016</a:t>
             </a:fld>
             <a:endParaRPr lang="en-GB"/>
           </a:p>
@@ -1041,7 +1041,7 @@
             <a:fld id="{FD1CC3C9-FD01-47C3-B06A-DFA58B2AD276}" type="datetimeFigureOut">
               <a:rPr lang="en-GB" smtClean="0"/>
               <a:pPr/>
-              <a:t>03/12/2016</a:t>
+              <a:t>04/12/2016</a:t>
             </a:fld>
             <a:endParaRPr lang="en-GB"/>
           </a:p>
@@ -1093,7 +1093,7 @@
     </p:spTree>
     <p:extLst>
       <p:ext uri="{BB962C8B-B14F-4D97-AF65-F5344CB8AC3E}">
-        <p14:creationId xmlns="" xmlns:p14="http://schemas.microsoft.com/office/powerpoint/2010/main" val="980979745"/>
+        <p14:creationId xmlns:p14="http://schemas.microsoft.com/office/powerpoint/2010/main" xmlns="" val="980979745"/>
       </p:ext>
     </p:extLst>
   </p:cSld>
@@ -1213,7 +1213,7 @@
             <a:fld id="{FD1CC3C9-FD01-47C3-B06A-DFA58B2AD276}" type="datetimeFigureOut">
               <a:rPr lang="en-GB" smtClean="0"/>
               <a:pPr/>
-              <a:t>03/12/2016</a:t>
+              <a:t>04/12/2016</a:t>
             </a:fld>
             <a:endParaRPr lang="en-GB"/>
           </a:p>
@@ -1265,7 +1265,7 @@
     </p:spTree>
     <p:extLst>
       <p:ext uri="{BB962C8B-B14F-4D97-AF65-F5344CB8AC3E}">
-        <p14:creationId xmlns="" xmlns:p14="http://schemas.microsoft.com/office/powerpoint/2010/main" val="1922985136"/>
+        <p14:creationId xmlns:p14="http://schemas.microsoft.com/office/powerpoint/2010/main" xmlns="" val="1922985136"/>
       </p:ext>
     </p:extLst>
   </p:cSld>
@@ -1395,7 +1395,7 @@
             <a:fld id="{FD1CC3C9-FD01-47C3-B06A-DFA58B2AD276}" type="datetimeFigureOut">
               <a:rPr lang="en-GB" smtClean="0"/>
               <a:pPr/>
-              <a:t>03/12/2016</a:t>
+              <a:t>04/12/2016</a:t>
             </a:fld>
             <a:endParaRPr lang="en-GB"/>
           </a:p>
@@ -1447,7 +1447,7 @@
     </p:spTree>
     <p:extLst>
       <p:ext uri="{BB962C8B-B14F-4D97-AF65-F5344CB8AC3E}">
-        <p14:creationId xmlns="" xmlns:p14="http://schemas.microsoft.com/office/powerpoint/2010/main" val="3113491001"/>
+        <p14:creationId xmlns:p14="http://schemas.microsoft.com/office/powerpoint/2010/main" xmlns="" val="3113491001"/>
       </p:ext>
     </p:extLst>
   </p:cSld>
@@ -1567,7 +1567,7 @@
             <a:fld id="{FD1CC3C9-FD01-47C3-B06A-DFA58B2AD276}" type="datetimeFigureOut">
               <a:rPr lang="en-GB" smtClean="0"/>
               <a:pPr/>
-              <a:t>03/12/2016</a:t>
+              <a:t>04/12/2016</a:t>
             </a:fld>
             <a:endParaRPr lang="en-GB"/>
           </a:p>
@@ -1619,7 +1619,7 @@
     </p:spTree>
     <p:extLst>
       <p:ext uri="{BB962C8B-B14F-4D97-AF65-F5344CB8AC3E}">
-        <p14:creationId xmlns="" xmlns:p14="http://schemas.microsoft.com/office/powerpoint/2010/main" val="215921456"/>
+        <p14:creationId xmlns:p14="http://schemas.microsoft.com/office/powerpoint/2010/main" xmlns="" val="215921456"/>
       </p:ext>
     </p:extLst>
   </p:cSld>
@@ -1815,7 +1815,7 @@
             <a:fld id="{FD1CC3C9-FD01-47C3-B06A-DFA58B2AD276}" type="datetimeFigureOut">
               <a:rPr lang="en-GB" smtClean="0"/>
               <a:pPr/>
-              <a:t>03/12/2016</a:t>
+              <a:t>04/12/2016</a:t>
             </a:fld>
             <a:endParaRPr lang="en-GB"/>
           </a:p>
@@ -1867,7 +1867,7 @@
     </p:spTree>
     <p:extLst>
       <p:ext uri="{BB962C8B-B14F-4D97-AF65-F5344CB8AC3E}">
-        <p14:creationId xmlns="" xmlns:p14="http://schemas.microsoft.com/office/powerpoint/2010/main" val="3198142514"/>
+        <p14:creationId xmlns:p14="http://schemas.microsoft.com/office/powerpoint/2010/main" xmlns="" val="3198142514"/>
       </p:ext>
     </p:extLst>
   </p:cSld>
@@ -2105,7 +2105,7 @@
             <a:fld id="{FD1CC3C9-FD01-47C3-B06A-DFA58B2AD276}" type="datetimeFigureOut">
               <a:rPr lang="en-GB" smtClean="0"/>
               <a:pPr/>
-              <a:t>03/12/2016</a:t>
+              <a:t>04/12/2016</a:t>
             </a:fld>
             <a:endParaRPr lang="en-GB"/>
           </a:p>
@@ -2157,7 +2157,7 @@
     </p:spTree>
     <p:extLst>
       <p:ext uri="{BB962C8B-B14F-4D97-AF65-F5344CB8AC3E}">
-        <p14:creationId xmlns="" xmlns:p14="http://schemas.microsoft.com/office/powerpoint/2010/main" val="354152659"/>
+        <p14:creationId xmlns:p14="http://schemas.microsoft.com/office/powerpoint/2010/main" xmlns="" val="354152659"/>
       </p:ext>
     </p:extLst>
   </p:cSld>
@@ -2529,7 +2529,7 @@
             <a:fld id="{FD1CC3C9-FD01-47C3-B06A-DFA58B2AD276}" type="datetimeFigureOut">
               <a:rPr lang="en-GB" smtClean="0"/>
               <a:pPr/>
-              <a:t>03/12/2016</a:t>
+              <a:t>04/12/2016</a:t>
             </a:fld>
             <a:endParaRPr lang="en-GB"/>
           </a:p>
@@ -2581,7 +2581,7 @@
     </p:spTree>
     <p:extLst>
       <p:ext uri="{BB962C8B-B14F-4D97-AF65-F5344CB8AC3E}">
-        <p14:creationId xmlns="" xmlns:p14="http://schemas.microsoft.com/office/powerpoint/2010/main" val="2943182003"/>
+        <p14:creationId xmlns:p14="http://schemas.microsoft.com/office/powerpoint/2010/main" xmlns="" val="2943182003"/>
       </p:ext>
     </p:extLst>
   </p:cSld>
@@ -2649,7 +2649,7 @@
             <a:fld id="{FD1CC3C9-FD01-47C3-B06A-DFA58B2AD276}" type="datetimeFigureOut">
               <a:rPr lang="en-GB" smtClean="0"/>
               <a:pPr/>
-              <a:t>03/12/2016</a:t>
+              <a:t>04/12/2016</a:t>
             </a:fld>
             <a:endParaRPr lang="en-GB"/>
           </a:p>
@@ -2701,7 +2701,7 @@
     </p:spTree>
     <p:extLst>
       <p:ext uri="{BB962C8B-B14F-4D97-AF65-F5344CB8AC3E}">
-        <p14:creationId xmlns="" xmlns:p14="http://schemas.microsoft.com/office/powerpoint/2010/main" val="374939806"/>
+        <p14:creationId xmlns:p14="http://schemas.microsoft.com/office/powerpoint/2010/main" xmlns="" val="374939806"/>
       </p:ext>
     </p:extLst>
   </p:cSld>
@@ -2746,7 +2746,7 @@
             <a:fld id="{FD1CC3C9-FD01-47C3-B06A-DFA58B2AD276}" type="datetimeFigureOut">
               <a:rPr lang="en-GB" smtClean="0"/>
               <a:pPr/>
-              <a:t>03/12/2016</a:t>
+              <a:t>04/12/2016</a:t>
             </a:fld>
             <a:endParaRPr lang="en-GB"/>
           </a:p>
@@ -2798,7 +2798,7 @@
     </p:spTree>
     <p:extLst>
       <p:ext uri="{BB962C8B-B14F-4D97-AF65-F5344CB8AC3E}">
-        <p14:creationId xmlns="" xmlns:p14="http://schemas.microsoft.com/office/powerpoint/2010/main" val="2762883317"/>
+        <p14:creationId xmlns:p14="http://schemas.microsoft.com/office/powerpoint/2010/main" xmlns="" val="2762883317"/>
       </p:ext>
     </p:extLst>
   </p:cSld>
@@ -3025,7 +3025,7 @@
             <a:fld id="{FD1CC3C9-FD01-47C3-B06A-DFA58B2AD276}" type="datetimeFigureOut">
               <a:rPr lang="en-GB" smtClean="0"/>
               <a:pPr/>
-              <a:t>03/12/2016</a:t>
+              <a:t>04/12/2016</a:t>
             </a:fld>
             <a:endParaRPr lang="en-GB"/>
           </a:p>
@@ -3077,7 +3077,7 @@
     </p:spTree>
     <p:extLst>
       <p:ext uri="{BB962C8B-B14F-4D97-AF65-F5344CB8AC3E}">
-        <p14:creationId xmlns="" xmlns:p14="http://schemas.microsoft.com/office/powerpoint/2010/main" val="2084638986"/>
+        <p14:creationId xmlns:p14="http://schemas.microsoft.com/office/powerpoint/2010/main" xmlns="" val="2084638986"/>
       </p:ext>
     </p:extLst>
   </p:cSld>
@@ -3280,7 +3280,7 @@
             <a:fld id="{FD1CC3C9-FD01-47C3-B06A-DFA58B2AD276}" type="datetimeFigureOut">
               <a:rPr lang="en-GB" smtClean="0"/>
               <a:pPr/>
-              <a:t>03/12/2016</a:t>
+              <a:t>04/12/2016</a:t>
             </a:fld>
             <a:endParaRPr lang="en-GB"/>
           </a:p>
@@ -3332,7 +3332,7 @@
     </p:spTree>
     <p:extLst>
       <p:ext uri="{BB962C8B-B14F-4D97-AF65-F5344CB8AC3E}">
-        <p14:creationId xmlns="" xmlns:p14="http://schemas.microsoft.com/office/powerpoint/2010/main" val="419711352"/>
+        <p14:creationId xmlns:p14="http://schemas.microsoft.com/office/powerpoint/2010/main" xmlns="" val="419711352"/>
       </p:ext>
     </p:extLst>
   </p:cSld>
@@ -3495,7 +3495,7 @@
             <a:fld id="{FD1CC3C9-FD01-47C3-B06A-DFA58B2AD276}" type="datetimeFigureOut">
               <a:rPr lang="en-GB" smtClean="0"/>
               <a:pPr/>
-              <a:t>03/12/2016</a:t>
+              <a:t>04/12/2016</a:t>
             </a:fld>
             <a:endParaRPr lang="en-GB"/>
           </a:p>
@@ -3583,7 +3583,7 @@
     </p:spTree>
     <p:extLst>
       <p:ext uri="{BB962C8B-B14F-4D97-AF65-F5344CB8AC3E}">
-        <p14:creationId xmlns="" xmlns:p14="http://schemas.microsoft.com/office/powerpoint/2010/main" val="2844166414"/>
+        <p14:creationId xmlns:p14="http://schemas.microsoft.com/office/powerpoint/2010/main" xmlns="" val="2844166414"/>
       </p:ext>
     </p:extLst>
   </p:cSld>
@@ -3924,7 +3924,7 @@
           <a:blip r:embed="rId2" cstate="print">
             <a:extLst>
               <a:ext uri="{28A0092B-C50C-407E-A947-70E740481C1C}">
-                <a14:useLocalDpi xmlns="" xmlns:a14="http://schemas.microsoft.com/office/drawing/2010/main" val="0"/>
+                <a14:useLocalDpi xmlns:a14="http://schemas.microsoft.com/office/drawing/2010/main" xmlns="" val="0"/>
               </a:ext>
             </a:extLst>
           </a:blip>
@@ -3944,7 +3944,7 @@
           <a:noFill/>
           <a:extLst>
             <a:ext uri="{909E8E84-426E-40DD-AFC4-6F175D3DCCD1}">
-              <a14:hiddenFill xmlns="" xmlns:a14="http://schemas.microsoft.com/office/drawing/2010/main">
+              <a14:hiddenFill xmlns:a14="http://schemas.microsoft.com/office/drawing/2010/main" xmlns="">
                 <a:solidFill>
                   <a:srgbClr val="FFFFFF"/>
                 </a:solidFill>
@@ -3956,7 +3956,7 @@
     </p:spTree>
     <p:extLst>
       <p:ext uri="{BB962C8B-B14F-4D97-AF65-F5344CB8AC3E}">
-        <p14:creationId xmlns="" xmlns:p14="http://schemas.microsoft.com/office/powerpoint/2010/main" val="4153523087"/>
+        <p14:creationId xmlns:p14="http://schemas.microsoft.com/office/powerpoint/2010/main" xmlns="" val="4153523087"/>
       </p:ext>
     </p:extLst>
   </p:cSld>
@@ -4063,7 +4063,7 @@
           <a:blip r:embed="rId3" cstate="print">
             <a:extLst>
               <a:ext uri="{28A0092B-C50C-407E-A947-70E740481C1C}">
-                <a14:useLocalDpi xmlns="" xmlns:a14="http://schemas.microsoft.com/office/drawing/2010/main" val="0"/>
+                <a14:useLocalDpi xmlns:a14="http://schemas.microsoft.com/office/drawing/2010/main" xmlns="" val="0"/>
               </a:ext>
             </a:extLst>
           </a:blip>
@@ -4083,7 +4083,7 @@
           <a:noFill/>
           <a:extLst>
             <a:ext uri="{909E8E84-426E-40DD-AFC4-6F175D3DCCD1}">
-              <a14:hiddenFill xmlns="" xmlns:a14="http://schemas.microsoft.com/office/drawing/2010/main">
+              <a14:hiddenFill xmlns:a14="http://schemas.microsoft.com/office/drawing/2010/main" xmlns="">
                 <a:solidFill>
                   <a:srgbClr val="FFFFFF"/>
                 </a:solidFill>
@@ -4095,7 +4095,7 @@
     </p:spTree>
     <p:extLst>
       <p:ext uri="{BB962C8B-B14F-4D97-AF65-F5344CB8AC3E}">
-        <p14:creationId xmlns="" xmlns:p14="http://schemas.microsoft.com/office/powerpoint/2010/main" val="2286413160"/>
+        <p14:creationId xmlns:p14="http://schemas.microsoft.com/office/powerpoint/2010/main" xmlns="" val="2286413160"/>
       </p:ext>
     </p:extLst>
   </p:cSld>
@@ -4198,6 +4198,158 @@
   <p:clrMapOvr>
     <a:masterClrMapping/>
   </p:clrMapOvr>
+  <p:timing>
+    <p:tnLst>
+      <p:par>
+        <p:cTn id="1" dur="indefinite" restart="never" nodeType="tmRoot">
+          <p:childTnLst>
+            <p:seq concurrent="1" nextAc="seek">
+              <p:cTn id="2" dur="indefinite" nodeType="mainSeq">
+                <p:childTnLst>
+                  <p:par>
+                    <p:cTn id="3" fill="hold">
+                      <p:stCondLst>
+                        <p:cond delay="indefinite"/>
+                      </p:stCondLst>
+                      <p:childTnLst>
+                        <p:par>
+                          <p:cTn id="4" fill="hold">
+                            <p:stCondLst>
+                              <p:cond delay="0"/>
+                            </p:stCondLst>
+                            <p:childTnLst>
+                              <p:par>
+                                <p:cTn id="5" presetID="4" presetClass="entr" presetSubtype="16" fill="hold" nodeType="clickEffect">
+                                  <p:stCondLst>
+                                    <p:cond delay="0"/>
+                                  </p:stCondLst>
+                                  <p:childTnLst>
+                                    <p:set>
+                                      <p:cBhvr>
+                                        <p:cTn id="6" dur="1" fill="hold">
+                                          <p:stCondLst>
+                                            <p:cond delay="0"/>
+                                          </p:stCondLst>
+                                        </p:cTn>
+                                        <p:tgtEl>
+                                          <p:spTgt spid="3">
+                                            <p:txEl>
+                                              <p:pRg st="0" end="0"/>
+                                            </p:txEl>
+                                          </p:spTgt>
+                                        </p:tgtEl>
+                                        <p:attrNameLst>
+                                          <p:attrName>style.visibility</p:attrName>
+                                        </p:attrNameLst>
+                                      </p:cBhvr>
+                                      <p:to>
+                                        <p:strVal val="visible"/>
+                                      </p:to>
+                                    </p:set>
+                                    <p:animEffect transition="in" filter="box(in)">
+                                      <p:cBhvr>
+                                        <p:cTn id="7" dur="500"/>
+                                        <p:tgtEl>
+                                          <p:spTgt spid="3">
+                                            <p:txEl>
+                                              <p:pRg st="0" end="0"/>
+                                            </p:txEl>
+                                          </p:spTgt>
+                                        </p:tgtEl>
+                                      </p:cBhvr>
+                                    </p:animEffect>
+                                  </p:childTnLst>
+                                </p:cTn>
+                              </p:par>
+                            </p:childTnLst>
+                          </p:cTn>
+                        </p:par>
+                      </p:childTnLst>
+                    </p:cTn>
+                  </p:par>
+                  <p:par>
+                    <p:cTn id="8" fill="hold">
+                      <p:stCondLst>
+                        <p:cond delay="indefinite"/>
+                      </p:stCondLst>
+                      <p:childTnLst>
+                        <p:par>
+                          <p:cTn id="9" fill="hold">
+                            <p:stCondLst>
+                              <p:cond delay="0"/>
+                            </p:stCondLst>
+                            <p:childTnLst>
+                              <p:par>
+                                <p:cTn id="10" presetID="8" presetClass="entr" presetSubtype="16" fill="hold" nodeType="clickEffect">
+                                  <p:stCondLst>
+                                    <p:cond delay="0"/>
+                                  </p:stCondLst>
+                                  <p:childTnLst>
+                                    <p:set>
+                                      <p:cBhvr>
+                                        <p:cTn id="11" dur="1" fill="hold">
+                                          <p:stCondLst>
+                                            <p:cond delay="0"/>
+                                          </p:stCondLst>
+                                        </p:cTn>
+                                        <p:tgtEl>
+                                          <p:spTgt spid="3">
+                                            <p:txEl>
+                                              <p:pRg st="1" end="1"/>
+                                            </p:txEl>
+                                          </p:spTgt>
+                                        </p:tgtEl>
+                                        <p:attrNameLst>
+                                          <p:attrName>style.visibility</p:attrName>
+                                        </p:attrNameLst>
+                                      </p:cBhvr>
+                                      <p:to>
+                                        <p:strVal val="visible"/>
+                                      </p:to>
+                                    </p:set>
+                                    <p:animEffect transition="in" filter="diamond(in)">
+                                      <p:cBhvr>
+                                        <p:cTn id="12" dur="2000"/>
+                                        <p:tgtEl>
+                                          <p:spTgt spid="3">
+                                            <p:txEl>
+                                              <p:pRg st="1" end="1"/>
+                                            </p:txEl>
+                                          </p:spTgt>
+                                        </p:tgtEl>
+                                      </p:cBhvr>
+                                    </p:animEffect>
+                                  </p:childTnLst>
+                                </p:cTn>
+                              </p:par>
+                            </p:childTnLst>
+                          </p:cTn>
+                        </p:par>
+                      </p:childTnLst>
+                    </p:cTn>
+                  </p:par>
+                </p:childTnLst>
+              </p:cTn>
+              <p:prevCondLst>
+                <p:cond evt="onPrev" delay="0">
+                  <p:tgtEl>
+                    <p:sldTgt/>
+                  </p:tgtEl>
+                </p:cond>
+              </p:prevCondLst>
+              <p:nextCondLst>
+                <p:cond evt="onNext" delay="0">
+                  <p:tgtEl>
+                    <p:sldTgt/>
+                  </p:tgtEl>
+                </p:cond>
+              </p:nextCondLst>
+            </p:seq>
+          </p:childTnLst>
+        </p:cTn>
+      </p:par>
+    </p:tnLst>
+  </p:timing>
 </p:sld>
 </file>
 
@@ -4273,7 +4425,7 @@
           <a:blip r:embed="rId3" cstate="print">
             <a:extLst>
               <a:ext uri="{28A0092B-C50C-407E-A947-70E740481C1C}">
-                <a14:useLocalDpi xmlns="" xmlns:a14="http://schemas.microsoft.com/office/drawing/2010/main" val="0"/>
+                <a14:useLocalDpi xmlns:a14="http://schemas.microsoft.com/office/drawing/2010/main" xmlns="" val="0"/>
               </a:ext>
             </a:extLst>
           </a:blip>
@@ -4293,7 +4445,7 @@
           <a:noFill/>
           <a:extLst>
             <a:ext uri="{909E8E84-426E-40DD-AFC4-6F175D3DCCD1}">
-              <a14:hiddenFill xmlns="" xmlns:a14="http://schemas.microsoft.com/office/drawing/2010/main">
+              <a14:hiddenFill xmlns:a14="http://schemas.microsoft.com/office/drawing/2010/main" xmlns="">
                 <a:solidFill>
                   <a:srgbClr val="FFFFFF"/>
                 </a:solidFill>
@@ -4305,7 +4457,7 @@
     </p:spTree>
     <p:extLst>
       <p:ext uri="{BB962C8B-B14F-4D97-AF65-F5344CB8AC3E}">
-        <p14:creationId xmlns="" xmlns:p14="http://schemas.microsoft.com/office/powerpoint/2010/main" val="2137850356"/>
+        <p14:creationId xmlns:p14="http://schemas.microsoft.com/office/powerpoint/2010/main" xmlns="" val="2137850356"/>
       </p:ext>
     </p:extLst>
   </p:cSld>
@@ -4421,7 +4573,7 @@
           <a:blip r:embed="rId4" cstate="print">
             <a:extLst>
               <a:ext uri="{28A0092B-C50C-407E-A947-70E740481C1C}">
-                <a14:useLocalDpi xmlns="" xmlns:a14="http://schemas.microsoft.com/office/drawing/2010/main" val="0"/>
+                <a14:useLocalDpi xmlns:a14="http://schemas.microsoft.com/office/drawing/2010/main" xmlns="" val="0"/>
               </a:ext>
             </a:extLst>
           </a:blip>
@@ -4441,7 +4593,7 @@
           <a:noFill/>
           <a:extLst>
             <a:ext uri="{909E8E84-426E-40DD-AFC4-6F175D3DCCD1}">
-              <a14:hiddenFill xmlns="" xmlns:a14="http://schemas.microsoft.com/office/drawing/2010/main">
+              <a14:hiddenFill xmlns:a14="http://schemas.microsoft.com/office/drawing/2010/main" xmlns="">
                 <a:solidFill>
                   <a:srgbClr val="FFFFFF"/>
                 </a:solidFill>
@@ -4483,7 +4635,7 @@
     </p:spTree>
     <p:extLst>
       <p:ext uri="{BB962C8B-B14F-4D97-AF65-F5344CB8AC3E}">
-        <p14:creationId xmlns="" xmlns:p14="http://schemas.microsoft.com/office/powerpoint/2010/main" val="229895401"/>
+        <p14:creationId xmlns:p14="http://schemas.microsoft.com/office/powerpoint/2010/main" xmlns="" val="229895401"/>
       </p:ext>
     </p:extLst>
   </p:cSld>
@@ -4620,6 +4772,432 @@
   <p:clrMapOvr>
     <a:masterClrMapping/>
   </p:clrMapOvr>
+  <p:timing>
+    <p:tnLst>
+      <p:par>
+        <p:cTn id="1" dur="indefinite" restart="never" nodeType="tmRoot">
+          <p:childTnLst>
+            <p:seq concurrent="1" nextAc="seek">
+              <p:cTn id="2" dur="indefinite" nodeType="mainSeq">
+                <p:childTnLst>
+                  <p:par>
+                    <p:cTn id="3" fill="hold">
+                      <p:stCondLst>
+                        <p:cond delay="indefinite"/>
+                      </p:stCondLst>
+                      <p:childTnLst>
+                        <p:par>
+                          <p:cTn id="4" fill="hold">
+                            <p:stCondLst>
+                              <p:cond delay="0"/>
+                            </p:stCondLst>
+                            <p:childTnLst>
+                              <p:par>
+                                <p:cTn id="5" presetID="2" presetClass="entr" presetSubtype="4" fill="hold" nodeType="clickEffect">
+                                  <p:stCondLst>
+                                    <p:cond delay="0"/>
+                                  </p:stCondLst>
+                                  <p:childTnLst>
+                                    <p:set>
+                                      <p:cBhvr>
+                                        <p:cTn id="6" dur="1" fill="hold">
+                                          <p:stCondLst>
+                                            <p:cond delay="0"/>
+                                          </p:stCondLst>
+                                        </p:cTn>
+                                        <p:tgtEl>
+                                          <p:spTgt spid="3">
+                                            <p:txEl>
+                                              <p:pRg st="0" end="0"/>
+                                            </p:txEl>
+                                          </p:spTgt>
+                                        </p:tgtEl>
+                                        <p:attrNameLst>
+                                          <p:attrName>style.visibility</p:attrName>
+                                        </p:attrNameLst>
+                                      </p:cBhvr>
+                                      <p:to>
+                                        <p:strVal val="visible"/>
+                                      </p:to>
+                                    </p:set>
+                                    <p:anim calcmode="lin" valueType="num">
+                                      <p:cBhvr additive="base">
+                                        <p:cTn id="7" dur="500" fill="hold"/>
+                                        <p:tgtEl>
+                                          <p:spTgt spid="3">
+                                            <p:txEl>
+                                              <p:pRg st="0" end="0"/>
+                                            </p:txEl>
+                                          </p:spTgt>
+                                        </p:tgtEl>
+                                        <p:attrNameLst>
+                                          <p:attrName>ppt_x</p:attrName>
+                                        </p:attrNameLst>
+                                      </p:cBhvr>
+                                      <p:tavLst>
+                                        <p:tav tm="0">
+                                          <p:val>
+                                            <p:strVal val="#ppt_x"/>
+                                          </p:val>
+                                        </p:tav>
+                                        <p:tav tm="100000">
+                                          <p:val>
+                                            <p:strVal val="#ppt_x"/>
+                                          </p:val>
+                                        </p:tav>
+                                      </p:tavLst>
+                                    </p:anim>
+                                    <p:anim calcmode="lin" valueType="num">
+                                      <p:cBhvr additive="base">
+                                        <p:cTn id="8" dur="500" fill="hold"/>
+                                        <p:tgtEl>
+                                          <p:spTgt spid="3">
+                                            <p:txEl>
+                                              <p:pRg st="0" end="0"/>
+                                            </p:txEl>
+                                          </p:spTgt>
+                                        </p:tgtEl>
+                                        <p:attrNameLst>
+                                          <p:attrName>ppt_y</p:attrName>
+                                        </p:attrNameLst>
+                                      </p:cBhvr>
+                                      <p:tavLst>
+                                        <p:tav tm="0">
+                                          <p:val>
+                                            <p:strVal val="1+#ppt_h/2"/>
+                                          </p:val>
+                                        </p:tav>
+                                        <p:tav tm="100000">
+                                          <p:val>
+                                            <p:strVal val="#ppt_y"/>
+                                          </p:val>
+                                        </p:tav>
+                                      </p:tavLst>
+                                    </p:anim>
+                                  </p:childTnLst>
+                                </p:cTn>
+                              </p:par>
+                              <p:par>
+                                <p:cTn id="9" presetID="2" presetClass="entr" presetSubtype="4" fill="hold" nodeType="withEffect">
+                                  <p:stCondLst>
+                                    <p:cond delay="0"/>
+                                  </p:stCondLst>
+                                  <p:childTnLst>
+                                    <p:set>
+                                      <p:cBhvr>
+                                        <p:cTn id="10" dur="1" fill="hold">
+                                          <p:stCondLst>
+                                            <p:cond delay="0"/>
+                                          </p:stCondLst>
+                                        </p:cTn>
+                                        <p:tgtEl>
+                                          <p:spTgt spid="3">
+                                            <p:txEl>
+                                              <p:pRg st="1" end="1"/>
+                                            </p:txEl>
+                                          </p:spTgt>
+                                        </p:tgtEl>
+                                        <p:attrNameLst>
+                                          <p:attrName>style.visibility</p:attrName>
+                                        </p:attrNameLst>
+                                      </p:cBhvr>
+                                      <p:to>
+                                        <p:strVal val="visible"/>
+                                      </p:to>
+                                    </p:set>
+                                    <p:anim calcmode="lin" valueType="num">
+                                      <p:cBhvr additive="base">
+                                        <p:cTn id="11" dur="500" fill="hold"/>
+                                        <p:tgtEl>
+                                          <p:spTgt spid="3">
+                                            <p:txEl>
+                                              <p:pRg st="1" end="1"/>
+                                            </p:txEl>
+                                          </p:spTgt>
+                                        </p:tgtEl>
+                                        <p:attrNameLst>
+                                          <p:attrName>ppt_x</p:attrName>
+                                        </p:attrNameLst>
+                                      </p:cBhvr>
+                                      <p:tavLst>
+                                        <p:tav tm="0">
+                                          <p:val>
+                                            <p:strVal val="#ppt_x"/>
+                                          </p:val>
+                                        </p:tav>
+                                        <p:tav tm="100000">
+                                          <p:val>
+                                            <p:strVal val="#ppt_x"/>
+                                          </p:val>
+                                        </p:tav>
+                                      </p:tavLst>
+                                    </p:anim>
+                                    <p:anim calcmode="lin" valueType="num">
+                                      <p:cBhvr additive="base">
+                                        <p:cTn id="12" dur="500" fill="hold"/>
+                                        <p:tgtEl>
+                                          <p:spTgt spid="3">
+                                            <p:txEl>
+                                              <p:pRg st="1" end="1"/>
+                                            </p:txEl>
+                                          </p:spTgt>
+                                        </p:tgtEl>
+                                        <p:attrNameLst>
+                                          <p:attrName>ppt_y</p:attrName>
+                                        </p:attrNameLst>
+                                      </p:cBhvr>
+                                      <p:tavLst>
+                                        <p:tav tm="0">
+                                          <p:val>
+                                            <p:strVal val="1+#ppt_h/2"/>
+                                          </p:val>
+                                        </p:tav>
+                                        <p:tav tm="100000">
+                                          <p:val>
+                                            <p:strVal val="#ppt_y"/>
+                                          </p:val>
+                                        </p:tav>
+                                      </p:tavLst>
+                                    </p:anim>
+                                  </p:childTnLst>
+                                </p:cTn>
+                              </p:par>
+                            </p:childTnLst>
+                          </p:cTn>
+                        </p:par>
+                      </p:childTnLst>
+                    </p:cTn>
+                  </p:par>
+                  <p:par>
+                    <p:cTn id="13" fill="hold">
+                      <p:stCondLst>
+                        <p:cond delay="indefinite"/>
+                      </p:stCondLst>
+                      <p:childTnLst>
+                        <p:par>
+                          <p:cTn id="14" fill="hold">
+                            <p:stCondLst>
+                              <p:cond delay="0"/>
+                            </p:stCondLst>
+                            <p:childTnLst>
+                              <p:par>
+                                <p:cTn id="15" presetID="20" presetClass="entr" presetSubtype="0" fill="hold" nodeType="clickEffect">
+                                  <p:stCondLst>
+                                    <p:cond delay="0"/>
+                                  </p:stCondLst>
+                                  <p:childTnLst>
+                                    <p:set>
+                                      <p:cBhvr>
+                                        <p:cTn id="16" dur="1" fill="hold">
+                                          <p:stCondLst>
+                                            <p:cond delay="0"/>
+                                          </p:stCondLst>
+                                        </p:cTn>
+                                        <p:tgtEl>
+                                          <p:spTgt spid="3">
+                                            <p:txEl>
+                                              <p:pRg st="2" end="2"/>
+                                            </p:txEl>
+                                          </p:spTgt>
+                                        </p:tgtEl>
+                                        <p:attrNameLst>
+                                          <p:attrName>style.visibility</p:attrName>
+                                        </p:attrNameLst>
+                                      </p:cBhvr>
+                                      <p:to>
+                                        <p:strVal val="visible"/>
+                                      </p:to>
+                                    </p:set>
+                                    <p:animEffect transition="in" filter="wedge">
+                                      <p:cBhvr>
+                                        <p:cTn id="17" dur="2000"/>
+                                        <p:tgtEl>
+                                          <p:spTgt spid="3">
+                                            <p:txEl>
+                                              <p:pRg st="2" end="2"/>
+                                            </p:txEl>
+                                          </p:spTgt>
+                                        </p:tgtEl>
+                                      </p:cBhvr>
+                                    </p:animEffect>
+                                  </p:childTnLst>
+                                </p:cTn>
+                              </p:par>
+                              <p:par>
+                                <p:cTn id="18" presetID="20" presetClass="entr" presetSubtype="0" fill="hold" nodeType="withEffect">
+                                  <p:stCondLst>
+                                    <p:cond delay="0"/>
+                                  </p:stCondLst>
+                                  <p:childTnLst>
+                                    <p:set>
+                                      <p:cBhvr>
+                                        <p:cTn id="19" dur="1" fill="hold">
+                                          <p:stCondLst>
+                                            <p:cond delay="0"/>
+                                          </p:stCondLst>
+                                        </p:cTn>
+                                        <p:tgtEl>
+                                          <p:spTgt spid="3">
+                                            <p:txEl>
+                                              <p:pRg st="3" end="3"/>
+                                            </p:txEl>
+                                          </p:spTgt>
+                                        </p:tgtEl>
+                                        <p:attrNameLst>
+                                          <p:attrName>style.visibility</p:attrName>
+                                        </p:attrNameLst>
+                                      </p:cBhvr>
+                                      <p:to>
+                                        <p:strVal val="visible"/>
+                                      </p:to>
+                                    </p:set>
+                                    <p:animEffect transition="in" filter="wedge">
+                                      <p:cBhvr>
+                                        <p:cTn id="20" dur="2000"/>
+                                        <p:tgtEl>
+                                          <p:spTgt spid="3">
+                                            <p:txEl>
+                                              <p:pRg st="3" end="3"/>
+                                            </p:txEl>
+                                          </p:spTgt>
+                                        </p:tgtEl>
+                                      </p:cBhvr>
+                                    </p:animEffect>
+                                  </p:childTnLst>
+                                </p:cTn>
+                              </p:par>
+                            </p:childTnLst>
+                          </p:cTn>
+                        </p:par>
+                      </p:childTnLst>
+                    </p:cTn>
+                  </p:par>
+                  <p:par>
+                    <p:cTn id="21" fill="hold">
+                      <p:stCondLst>
+                        <p:cond delay="indefinite"/>
+                      </p:stCondLst>
+                      <p:childTnLst>
+                        <p:par>
+                          <p:cTn id="22" fill="hold">
+                            <p:stCondLst>
+                              <p:cond delay="0"/>
+                            </p:stCondLst>
+                            <p:childTnLst>
+                              <p:par>
+                                <p:cTn id="23" presetID="4" presetClass="entr" presetSubtype="16" fill="hold" nodeType="clickEffect">
+                                  <p:stCondLst>
+                                    <p:cond delay="0"/>
+                                  </p:stCondLst>
+                                  <p:childTnLst>
+                                    <p:set>
+                                      <p:cBhvr>
+                                        <p:cTn id="24" dur="1" fill="hold">
+                                          <p:stCondLst>
+                                            <p:cond delay="0"/>
+                                          </p:stCondLst>
+                                        </p:cTn>
+                                        <p:tgtEl>
+                                          <p:spTgt spid="3">
+                                            <p:txEl>
+                                              <p:pRg st="4" end="4"/>
+                                            </p:txEl>
+                                          </p:spTgt>
+                                        </p:tgtEl>
+                                        <p:attrNameLst>
+                                          <p:attrName>style.visibility</p:attrName>
+                                        </p:attrNameLst>
+                                      </p:cBhvr>
+                                      <p:to>
+                                        <p:strVal val="visible"/>
+                                      </p:to>
+                                    </p:set>
+                                    <p:animEffect transition="in" filter="box(in)">
+                                      <p:cBhvr>
+                                        <p:cTn id="25" dur="500"/>
+                                        <p:tgtEl>
+                                          <p:spTgt spid="3">
+                                            <p:txEl>
+                                              <p:pRg st="4" end="4"/>
+                                            </p:txEl>
+                                          </p:spTgt>
+                                        </p:tgtEl>
+                                      </p:cBhvr>
+                                    </p:animEffect>
+                                  </p:childTnLst>
+                                </p:cTn>
+                              </p:par>
+                              <p:par>
+                                <p:cTn id="26" presetID="4" presetClass="entr" presetSubtype="16" fill="hold" nodeType="withEffect">
+                                  <p:stCondLst>
+                                    <p:cond delay="0"/>
+                                  </p:stCondLst>
+                                  <p:childTnLst>
+                                    <p:set>
+                                      <p:cBhvr>
+                                        <p:cTn id="27" dur="1" fill="hold">
+                                          <p:stCondLst>
+                                            <p:cond delay="0"/>
+                                          </p:stCondLst>
+                                        </p:cTn>
+                                        <p:tgtEl>
+                                          <p:spTgt spid="3">
+                                            <p:txEl>
+                                              <p:pRg st="5" end="5"/>
+                                            </p:txEl>
+                                          </p:spTgt>
+                                        </p:tgtEl>
+                                        <p:attrNameLst>
+                                          <p:attrName>style.visibility</p:attrName>
+                                        </p:attrNameLst>
+                                      </p:cBhvr>
+                                      <p:to>
+                                        <p:strVal val="visible"/>
+                                      </p:to>
+                                    </p:set>
+                                    <p:animEffect transition="in" filter="box(in)">
+                                      <p:cBhvr>
+                                        <p:cTn id="28" dur="500"/>
+                                        <p:tgtEl>
+                                          <p:spTgt spid="3">
+                                            <p:txEl>
+                                              <p:pRg st="5" end="5"/>
+                                            </p:txEl>
+                                          </p:spTgt>
+                                        </p:tgtEl>
+                                      </p:cBhvr>
+                                    </p:animEffect>
+                                  </p:childTnLst>
+                                </p:cTn>
+                              </p:par>
+                            </p:childTnLst>
+                          </p:cTn>
+                        </p:par>
+                      </p:childTnLst>
+                    </p:cTn>
+                  </p:par>
+                </p:childTnLst>
+              </p:cTn>
+              <p:prevCondLst>
+                <p:cond evt="onPrev" delay="0">
+                  <p:tgtEl>
+                    <p:sldTgt/>
+                  </p:tgtEl>
+                </p:cond>
+              </p:prevCondLst>
+              <p:nextCondLst>
+                <p:cond evt="onNext" delay="0">
+                  <p:tgtEl>
+                    <p:sldTgt/>
+                  </p:tgtEl>
+                </p:cond>
+              </p:nextCondLst>
+            </p:seq>
+          </p:childTnLst>
+        </p:cTn>
+      </p:par>
+    </p:tnLst>
+  </p:timing>
 </p:sld>
 </file>
 
@@ -4852,7 +5430,7 @@
           <a:blip r:embed="rId4" cstate="print">
             <a:extLst>
               <a:ext uri="{28A0092B-C50C-407E-A947-70E740481C1C}">
-                <a14:useLocalDpi xmlns="" xmlns:a14="http://schemas.microsoft.com/office/drawing/2010/main" val="0"/>
+                <a14:useLocalDpi xmlns:a14="http://schemas.microsoft.com/office/drawing/2010/main" xmlns="" val="0"/>
               </a:ext>
             </a:extLst>
           </a:blip>
@@ -4873,14 +5451,14 @@
           </a:ln>
           <a:extLst>
             <a:ext uri="{909E8E84-426E-40DD-AFC4-6F175D3DCCD1}">
-              <a14:hiddenFill xmlns="" xmlns:a14="http://schemas.microsoft.com/office/drawing/2010/main">
+              <a14:hiddenFill xmlns:a14="http://schemas.microsoft.com/office/drawing/2010/main" xmlns="">
                 <a:solidFill>
                   <a:schemeClr val="accent1"/>
                 </a:solidFill>
               </a14:hiddenFill>
             </a:ext>
             <a:ext uri="{91240B29-F687-4F45-9708-019B960494DF}">
-              <a14:hiddenLine xmlns="" xmlns:a14="http://schemas.microsoft.com/office/drawing/2010/main" w="9525">
+              <a14:hiddenLine xmlns:a14="http://schemas.microsoft.com/office/drawing/2010/main" xmlns="" w="9525">
                 <a:solidFill>
                   <a:schemeClr val="tx1"/>
                 </a:solidFill>
@@ -4923,7 +5501,7 @@
     </p:spTree>
     <p:extLst>
       <p:ext uri="{BB962C8B-B14F-4D97-AF65-F5344CB8AC3E}">
-        <p14:creationId xmlns="" xmlns:p14="http://schemas.microsoft.com/office/powerpoint/2010/main" val="2719578318"/>
+        <p14:creationId xmlns:p14="http://schemas.microsoft.com/office/powerpoint/2010/main" xmlns="" val="2719578318"/>
       </p:ext>
     </p:extLst>
   </p:cSld>
@@ -4974,15 +5552,7 @@
           <a:p>
             <a:r>
               <a:rPr lang="en-GB" dirty="0" smtClean="0"/>
-              <a:t>Assorted</a:t>
-            </a:r>
-            <a:r>
-              <a:rPr lang="en-GB" dirty="0" smtClean="0"/>
-              <a:t> </a:t>
-            </a:r>
-            <a:r>
-              <a:rPr lang="en-GB" dirty="0" smtClean="0"/>
-              <a:t>Loan Calculations</a:t>
+              <a:t>Assorted Loan Calculations</a:t>
             </a:r>
             <a:endParaRPr lang="en-GB" dirty="0"/>
           </a:p>
@@ -5022,11 +5592,6 @@
               </a:rPr>
               <a:t>task02.docx</a:t>
             </a:r>
-            <a:endParaRPr lang="en-GB" b="1" dirty="0" smtClean="0">
-              <a:solidFill>
-                <a:srgbClr val="FF0000"/>
-              </a:solidFill>
-            </a:endParaRPr>
           </a:p>
           <a:p>
             <a:r>
@@ -5169,7 +5734,15 @@
           <a:p>
             <a:r>
               <a:rPr lang="en-GB" dirty="0" smtClean="0"/>
-              <a:t>Create a word document “</a:t>
+              <a:t>Create a </a:t>
+            </a:r>
+            <a:r>
+              <a:rPr lang="en-GB" dirty="0" smtClean="0"/>
+              <a:t>blank word </a:t>
+            </a:r>
+            <a:r>
+              <a:rPr lang="en-GB" dirty="0" smtClean="0"/>
+              <a:t>document “</a:t>
             </a:r>
             <a:r>
               <a:rPr lang="en-GB" dirty="0" err="1" smtClean="0"/>
@@ -5213,11 +5786,7 @@
             <a:pPr lvl="1"/>
             <a:r>
               <a:rPr lang="en-GB" dirty="0" smtClean="0"/>
-              <a:t>try to find at least 6 </a:t>
-            </a:r>
-            <a:r>
-              <a:rPr lang="en-GB" dirty="0" smtClean="0"/>
-              <a:t>things</a:t>
+              <a:t>try to find at least 6 things</a:t>
             </a:r>
           </a:p>
           <a:p>
@@ -5242,6 +5811,13 @@
   <p:clrMapOvr>
     <a:masterClrMapping/>
   </p:clrMapOvr>
+  <p:timing>
+    <p:tnLst>
+      <p:par>
+        <p:cTn id="1" dur="indefinite" restart="never" nodeType="tmRoot"/>
+      </p:par>
+    </p:tnLst>
+  </p:timing>
 </p:sld>
 </file>
 
@@ -5339,6 +5915,13 @@
   <p:clrMapOvr>
     <a:masterClrMapping/>
   </p:clrMapOvr>
+  <p:timing>
+    <p:tnLst>
+      <p:par>
+        <p:cTn id="1" dur="indefinite" restart="never" nodeType="tmRoot"/>
+      </p:par>
+    </p:tnLst>
+  </p:timing>
 </p:sld>
 </file>
 
@@ -5430,7 +6013,7 @@
           <a:blip r:embed="rId3" cstate="print">
             <a:extLst>
               <a:ext uri="{28A0092B-C50C-407E-A947-70E740481C1C}">
-                <a14:useLocalDpi xmlns="" xmlns:a14="http://schemas.microsoft.com/office/drawing/2010/main" val="0"/>
+                <a14:useLocalDpi xmlns:a14="http://schemas.microsoft.com/office/drawing/2010/main" xmlns="" val="0"/>
               </a:ext>
             </a:extLst>
           </a:blip>
@@ -5450,7 +6033,7 @@
           <a:noFill/>
           <a:extLst>
             <a:ext uri="{909E8E84-426E-40DD-AFC4-6F175D3DCCD1}">
-              <a14:hiddenFill xmlns="" xmlns:a14="http://schemas.microsoft.com/office/drawing/2010/main">
+              <a14:hiddenFill xmlns:a14="http://schemas.microsoft.com/office/drawing/2010/main" xmlns="">
                 <a:solidFill>
                   <a:srgbClr val="FFFFFF"/>
                 </a:solidFill>
@@ -5462,7 +6045,7 @@
     </p:spTree>
     <p:extLst>
       <p:ext uri="{BB962C8B-B14F-4D97-AF65-F5344CB8AC3E}">
-        <p14:creationId xmlns="" xmlns:p14="http://schemas.microsoft.com/office/powerpoint/2010/main" val="529809207"/>
+        <p14:creationId xmlns:p14="http://schemas.microsoft.com/office/powerpoint/2010/main" xmlns="" val="529809207"/>
       </p:ext>
     </p:extLst>
   </p:cSld>
@@ -5567,7 +6150,7 @@
           <a:blip r:embed="rId2" cstate="print">
             <a:extLst>
               <a:ext uri="{28A0092B-C50C-407E-A947-70E740481C1C}">
-                <a14:useLocalDpi xmlns="" xmlns:a14="http://schemas.microsoft.com/office/drawing/2010/main" val="0"/>
+                <a14:useLocalDpi xmlns:a14="http://schemas.microsoft.com/office/drawing/2010/main" xmlns="" val="0"/>
               </a:ext>
             </a:extLst>
           </a:blip>
@@ -5587,7 +6170,7 @@
           <a:noFill/>
           <a:extLst>
             <a:ext uri="{909E8E84-426E-40DD-AFC4-6F175D3DCCD1}">
-              <a14:hiddenFill xmlns="" xmlns:a14="http://schemas.microsoft.com/office/drawing/2010/main">
+              <a14:hiddenFill xmlns:a14="http://schemas.microsoft.com/office/drawing/2010/main" xmlns="">
                 <a:solidFill>
                   <a:srgbClr val="FFFFFF"/>
                 </a:solidFill>
@@ -5599,7 +6182,7 @@
     </p:spTree>
     <p:extLst>
       <p:ext uri="{BB962C8B-B14F-4D97-AF65-F5344CB8AC3E}">
-        <p14:creationId xmlns="" xmlns:p14="http://schemas.microsoft.com/office/powerpoint/2010/main" val="1708264490"/>
+        <p14:creationId xmlns:p14="http://schemas.microsoft.com/office/powerpoint/2010/main" xmlns="" val="1708264490"/>
       </p:ext>
     </p:extLst>
   </p:cSld>
@@ -5695,7 +6278,7 @@
           <a:blip r:embed="rId2" cstate="print">
             <a:extLst>
               <a:ext uri="{28A0092B-C50C-407E-A947-70E740481C1C}">
-                <a14:useLocalDpi xmlns="" xmlns:a14="http://schemas.microsoft.com/office/drawing/2010/main" val="0"/>
+                <a14:useLocalDpi xmlns:a14="http://schemas.microsoft.com/office/drawing/2010/main" xmlns="" val="0"/>
               </a:ext>
             </a:extLst>
           </a:blip>
@@ -5715,7 +6298,7 @@
           <a:noFill/>
           <a:extLst>
             <a:ext uri="{909E8E84-426E-40DD-AFC4-6F175D3DCCD1}">
-              <a14:hiddenFill xmlns="" xmlns:a14="http://schemas.microsoft.com/office/drawing/2010/main">
+              <a14:hiddenFill xmlns:a14="http://schemas.microsoft.com/office/drawing/2010/main" xmlns="">
                 <a:solidFill>
                   <a:srgbClr val="FFFFFF"/>
                 </a:solidFill>
@@ -5727,7 +6310,7 @@
     </p:spTree>
     <p:extLst>
       <p:ext uri="{BB962C8B-B14F-4D97-AF65-F5344CB8AC3E}">
-        <p14:creationId xmlns="" xmlns:p14="http://schemas.microsoft.com/office/powerpoint/2010/main" val="1003174057"/>
+        <p14:creationId xmlns:p14="http://schemas.microsoft.com/office/powerpoint/2010/main" xmlns="" val="1003174057"/>
       </p:ext>
     </p:extLst>
   </p:cSld>
@@ -5816,7 +6399,7 @@
           <a:blip r:embed="rId3" cstate="print">
             <a:extLst>
               <a:ext uri="{28A0092B-C50C-407E-A947-70E740481C1C}">
-                <a14:useLocalDpi xmlns="" xmlns:a14="http://schemas.microsoft.com/office/drawing/2010/main" val="0"/>
+                <a14:useLocalDpi xmlns:a14="http://schemas.microsoft.com/office/drawing/2010/main" xmlns="" val="0"/>
               </a:ext>
             </a:extLst>
           </a:blip>
@@ -5836,7 +6419,7 @@
           <a:noFill/>
           <a:extLst>
             <a:ext uri="{909E8E84-426E-40DD-AFC4-6F175D3DCCD1}">
-              <a14:hiddenFill xmlns="" xmlns:a14="http://schemas.microsoft.com/office/drawing/2010/main">
+              <a14:hiddenFill xmlns:a14="http://schemas.microsoft.com/office/drawing/2010/main" xmlns="">
                 <a:solidFill>
                   <a:srgbClr val="FFFFFF"/>
                 </a:solidFill>
@@ -5848,7 +6431,7 @@
     </p:spTree>
     <p:extLst>
       <p:ext uri="{BB962C8B-B14F-4D97-AF65-F5344CB8AC3E}">
-        <p14:creationId xmlns="" xmlns:p14="http://schemas.microsoft.com/office/powerpoint/2010/main" val="3706863804"/>
+        <p14:creationId xmlns:p14="http://schemas.microsoft.com/office/powerpoint/2010/main" xmlns="" val="3706863804"/>
       </p:ext>
     </p:extLst>
   </p:cSld>
@@ -5955,7 +6538,7 @@
           <a:blip r:embed="rId4" cstate="print">
             <a:extLst>
               <a:ext uri="{28A0092B-C50C-407E-A947-70E740481C1C}">
-                <a14:useLocalDpi xmlns="" xmlns:a14="http://schemas.microsoft.com/office/drawing/2010/main" val="0"/>
+                <a14:useLocalDpi xmlns:a14="http://schemas.microsoft.com/office/drawing/2010/main" xmlns="" val="0"/>
               </a:ext>
             </a:extLst>
           </a:blip>
@@ -5975,7 +6558,7 @@
           <a:noFill/>
           <a:extLst>
             <a:ext uri="{909E8E84-426E-40DD-AFC4-6F175D3DCCD1}">
-              <a14:hiddenFill xmlns="" xmlns:a14="http://schemas.microsoft.com/office/drawing/2010/main">
+              <a14:hiddenFill xmlns:a14="http://schemas.microsoft.com/office/drawing/2010/main" xmlns="">
                 <a:solidFill>
                   <a:srgbClr val="FFFFFF"/>
                 </a:solidFill>
@@ -5987,7 +6570,7 @@
     </p:spTree>
     <p:extLst>
       <p:ext uri="{BB962C8B-B14F-4D97-AF65-F5344CB8AC3E}">
-        <p14:creationId xmlns="" xmlns:p14="http://schemas.microsoft.com/office/powerpoint/2010/main" val="1169492922"/>
+        <p14:creationId xmlns:p14="http://schemas.microsoft.com/office/powerpoint/2010/main" xmlns="" val="1169492922"/>
       </p:ext>
     </p:extLst>
   </p:cSld>
@@ -6088,7 +6671,7 @@
           <a:blip r:embed="rId3" cstate="print">
             <a:extLst>
               <a:ext uri="{28A0092B-C50C-407E-A947-70E740481C1C}">
-                <a14:useLocalDpi xmlns="" xmlns:a14="http://schemas.microsoft.com/office/drawing/2010/main" val="0"/>
+                <a14:useLocalDpi xmlns:a14="http://schemas.microsoft.com/office/drawing/2010/main" xmlns="" val="0"/>
               </a:ext>
             </a:extLst>
           </a:blip>
@@ -6108,7 +6691,7 @@
           <a:noFill/>
           <a:extLst>
             <a:ext uri="{909E8E84-426E-40DD-AFC4-6F175D3DCCD1}">
-              <a14:hiddenFill xmlns="" xmlns:a14="http://schemas.microsoft.com/office/drawing/2010/main">
+              <a14:hiddenFill xmlns:a14="http://schemas.microsoft.com/office/drawing/2010/main" xmlns="">
                 <a:solidFill>
                   <a:srgbClr val="FFFFFF"/>
                 </a:solidFill>
@@ -6120,7 +6703,7 @@
     </p:spTree>
     <p:extLst>
       <p:ext uri="{BB962C8B-B14F-4D97-AF65-F5344CB8AC3E}">
-        <p14:creationId xmlns="" xmlns:p14="http://schemas.microsoft.com/office/powerpoint/2010/main" val="3547174188"/>
+        <p14:creationId xmlns:p14="http://schemas.microsoft.com/office/powerpoint/2010/main" xmlns="" val="3547174188"/>
       </p:ext>
     </p:extLst>
   </p:cSld>
@@ -6227,7 +6810,7 @@
           <a:blip r:embed="rId3" cstate="print">
             <a:extLst>
               <a:ext uri="{28A0092B-C50C-407E-A947-70E740481C1C}">
-                <a14:useLocalDpi xmlns="" xmlns:a14="http://schemas.microsoft.com/office/drawing/2010/main" val="0"/>
+                <a14:useLocalDpi xmlns:a14="http://schemas.microsoft.com/office/drawing/2010/main" xmlns="" val="0"/>
               </a:ext>
             </a:extLst>
           </a:blip>
@@ -6247,7 +6830,7 @@
           <a:noFill/>
           <a:extLst>
             <a:ext uri="{909E8E84-426E-40DD-AFC4-6F175D3DCCD1}">
-              <a14:hiddenFill xmlns="" xmlns:a14="http://schemas.microsoft.com/office/drawing/2010/main">
+              <a14:hiddenFill xmlns:a14="http://schemas.microsoft.com/office/drawing/2010/main" xmlns="">
                 <a:solidFill>
                   <a:srgbClr val="FFFFFF"/>
                 </a:solidFill>
@@ -6259,7 +6842,7 @@
     </p:spTree>
     <p:extLst>
       <p:ext uri="{BB962C8B-B14F-4D97-AF65-F5344CB8AC3E}">
-        <p14:creationId xmlns="" xmlns:p14="http://schemas.microsoft.com/office/powerpoint/2010/main" val="3335667276"/>
+        <p14:creationId xmlns:p14="http://schemas.microsoft.com/office/powerpoint/2010/main" xmlns="" val="3335667276"/>
       </p:ext>
     </p:extLst>
   </p:cSld>
@@ -6591,7 +7174,7 @@
           <a:blip r:embed="rId3" cstate="print">
             <a:extLst>
               <a:ext uri="{28A0092B-C50C-407E-A947-70E740481C1C}">
-                <a14:useLocalDpi xmlns="" xmlns:a14="http://schemas.microsoft.com/office/drawing/2010/main" val="0"/>
+                <a14:useLocalDpi xmlns:a14="http://schemas.microsoft.com/office/drawing/2010/main" xmlns="" val="0"/>
               </a:ext>
             </a:extLst>
           </a:blip>
@@ -6611,7 +7194,7 @@
           <a:noFill/>
           <a:extLst>
             <a:ext uri="{909E8E84-426E-40DD-AFC4-6F175D3DCCD1}">
-              <a14:hiddenFill xmlns="" xmlns:a14="http://schemas.microsoft.com/office/drawing/2010/main">
+              <a14:hiddenFill xmlns:a14="http://schemas.microsoft.com/office/drawing/2010/main" xmlns="">
                 <a:solidFill>
                   <a:srgbClr val="FFFFFF"/>
                 </a:solidFill>
@@ -6623,7 +7206,7 @@
     </p:spTree>
     <p:extLst>
       <p:ext uri="{BB962C8B-B14F-4D97-AF65-F5344CB8AC3E}">
-        <p14:creationId xmlns="" xmlns:p14="http://schemas.microsoft.com/office/powerpoint/2010/main" val="185172268"/>
+        <p14:creationId xmlns:p14="http://schemas.microsoft.com/office/powerpoint/2010/main" xmlns="" val="185172268"/>
       </p:ext>
     </p:extLst>
   </p:cSld>

</xml_diff>